<commit_message>
worked at the powerpointpresentation
</commit_message>
<xml_diff>
--- a/Präsentation/Präsentation_Projektabschluss.pptx
+++ b/Präsentation/Präsentation_Projektabschluss.pptx
@@ -250,6 +250,9 @@
   <p:clrMapOvr>
     <a:masterClrMapping/>
   </p:clrMapOvr>
+  <p:transition spd="slow">
+    <p:fade thruBlk="1"/>
+  </p:transition>
 </p:sldLayout>
 </file>
 
@@ -446,6 +449,9 @@
   <p:clrMapOvr>
     <a:masterClrMapping/>
   </p:clrMapOvr>
+  <p:transition spd="slow">
+    <p:fade thruBlk="1"/>
+  </p:transition>
 </p:sldLayout>
 </file>
 
@@ -652,6 +658,9 @@
   <p:clrMapOvr>
     <a:masterClrMapping/>
   </p:clrMapOvr>
+  <p:transition spd="slow">
+    <p:fade thruBlk="1"/>
+  </p:transition>
 </p:sldLayout>
 </file>
 
@@ -879,6 +888,9 @@
   <p:clrMapOvr>
     <a:masterClrMapping/>
   </p:clrMapOvr>
+  <p:transition spd="slow">
+    <p:fade thruBlk="1"/>
+  </p:transition>
 </p:sldLayout>
 </file>
 
@@ -1159,6 +1171,9 @@
   <p:clrMapOvr>
     <a:masterClrMapping/>
   </p:clrMapOvr>
+  <p:transition spd="slow">
+    <p:fade thruBlk="1"/>
+  </p:transition>
 </p:sldLayout>
 </file>
 
@@ -1417,6 +1432,9 @@
   <p:clrMapOvr>
     <a:masterClrMapping/>
   </p:clrMapOvr>
+  <p:transition spd="slow">
+    <p:fade thruBlk="1"/>
+  </p:transition>
 </p:sldLayout>
 </file>
 
@@ -1810,6 +1828,9 @@
   <p:clrMapOvr>
     <a:masterClrMapping/>
   </p:clrMapOvr>
+  <p:transition spd="slow">
+    <p:fade thruBlk="1"/>
+  </p:transition>
 </p:sldLayout>
 </file>
 
@@ -1954,6 +1975,9 @@
   <p:clrMapOvr>
     <a:masterClrMapping/>
   </p:clrMapOvr>
+  <p:transition spd="slow">
+    <p:fade thruBlk="1"/>
+  </p:transition>
 </p:sldLayout>
 </file>
 
@@ -2075,6 +2099,9 @@
   <p:clrMapOvr>
     <a:masterClrMapping/>
   </p:clrMapOvr>
+  <p:transition spd="slow">
+    <p:fade thruBlk="1"/>
+  </p:transition>
 </p:sldLayout>
 </file>
 
@@ -2378,6 +2405,9 @@
   <p:clrMapOvr>
     <a:masterClrMapping/>
   </p:clrMapOvr>
+  <p:transition spd="slow">
+    <p:fade thruBlk="1"/>
+  </p:transition>
 </p:sldLayout>
 </file>
 
@@ -2661,6 +2691,9 @@
   <p:clrMapOvr>
     <a:masterClrMapping/>
   </p:clrMapOvr>
+  <p:transition spd="slow">
+    <p:fade thruBlk="1"/>
+  </p:transition>
 </p:sldLayout>
 </file>
 
@@ -2942,6 +2975,9 @@
     <p:sldLayoutId id="2147483658" r:id="rId10"/>
     <p:sldLayoutId id="2147483659" r:id="rId11"/>
   </p:sldLayoutIdLst>
+  <p:transition spd="slow">
+    <p:fade thruBlk="1"/>
+  </p:transition>
   <p:txStyles>
     <p:titleStyle>
       <a:lvl1pPr algn="l" defTabSz="914400" rtl="0" eaLnBrk="1" latinLnBrk="0" hangingPunct="1">
@@ -3252,6 +3288,16 @@
   <p:clrMapOvr>
     <a:masterClrMapping/>
   </p:clrMapOvr>
+  <p:transition spd="slow">
+    <p:fade thruBlk="1"/>
+  </p:transition>
+  <p:timing>
+    <p:tnLst>
+      <p:par>
+        <p:cTn id="1" dur="indefinite" restart="never" nodeType="tmRoot"/>
+      </p:par>
+    </p:tnLst>
+  </p:timing>
 </p:sld>
 </file>
 
@@ -3326,18 +3372,9 @@
   <p:clrMapOvr>
     <a:masterClrMapping/>
   </p:clrMapOvr>
-  <mc:AlternateContent xmlns:mc="http://schemas.openxmlformats.org/markup-compatibility/2006">
-    <mc:Choice xmlns="" xmlns:p159="http://schemas.microsoft.com/office/powerpoint/2015/09/main" Requires="p159">
-      <p:transition xmlns:p14="http://schemas.microsoft.com/office/powerpoint/2010/main" spd="slow" p14:dur="2000">
-        <p159:morph option="byObject"/>
-      </p:transition>
-    </mc:Choice>
-    <mc:Fallback>
-      <p:transition spd="slow">
-        <p:fade/>
-      </p:transition>
-    </mc:Fallback>
-  </mc:AlternateContent>
+  <p:transition spd="slow">
+    <p:fade thruBlk="1"/>
+  </p:transition>
 </p:sld>
 </file>
 
@@ -3435,18 +3472,9 @@
   <p:clrMapOvr>
     <a:masterClrMapping/>
   </p:clrMapOvr>
-  <mc:AlternateContent xmlns:mc="http://schemas.openxmlformats.org/markup-compatibility/2006">
-    <mc:Choice xmlns="" xmlns:p159="http://schemas.microsoft.com/office/powerpoint/2015/09/main" Requires="p159">
-      <p:transition xmlns:p14="http://schemas.microsoft.com/office/powerpoint/2010/main" spd="slow" p14:dur="2000">
-        <p159:morph option="byObject"/>
-      </p:transition>
-    </mc:Choice>
-    <mc:Fallback>
-      <p:transition spd="slow">
-        <p:fade/>
-      </p:transition>
-    </mc:Fallback>
-  </mc:AlternateContent>
+  <p:transition spd="slow">
+    <p:fade thruBlk="1"/>
+  </p:transition>
 </p:sld>
 </file>
 
@@ -3532,7 +3560,7 @@
     <a:masterClrMapping/>
   </p:clrMapOvr>
   <p:transition spd="slow">
-    <p:push dir="u"/>
+    <p:fade thruBlk="1"/>
   </p:transition>
 </p:sld>
 </file>
@@ -3618,18 +3646,25 @@
   <p:clrMapOvr>
     <a:masterClrMapping/>
   </p:clrMapOvr>
-  <mc:AlternateContent xmlns:mc="http://schemas.openxmlformats.org/markup-compatibility/2006" xmlns:p15="http://schemas.microsoft.com/office/powerpoint/2012/main">
-    <mc:Choice Requires="p15">
+  <mc:AlternateContent xmlns:mc="http://schemas.openxmlformats.org/markup-compatibility/2006">
+    <mc:Choice xmlns:p15="http://schemas.microsoft.com/office/powerpoint/2012/main" Requires="p15">
       <p:transition xmlns:p14="http://schemas.microsoft.com/office/powerpoint/2010/main" spd="slow" p14:dur="3000">
         <p15:prstTrans prst="curtains"/>
       </p:transition>
     </mc:Choice>
-    <mc:Fallback xmlns="">
+    <mc:Fallback>
       <p:transition spd="slow">
         <p:fade/>
       </p:transition>
     </mc:Fallback>
   </mc:AlternateContent>
+  <p:timing>
+    <p:tnLst>
+      <p:par>
+        <p:cTn id="1" dur="indefinite" restart="never" nodeType="tmRoot"/>
+      </p:par>
+    </p:tnLst>
+  </p:timing>
 </p:sld>
 </file>
 
@@ -3729,11 +3764,7 @@
           <a:p>
             <a:r>
               <a:rPr lang="de-CH" dirty="0"/>
-              <a:t>Hardware und </a:t>
-            </a:r>
-            <a:r>
-              <a:rPr lang="de-CH" dirty="0"/>
-              <a:t>Software </a:t>
+              <a:t>Hardware und Software </a:t>
             </a:r>
             <a:r>
               <a:rPr lang="de-CH" dirty="0" smtClean="0"/>
@@ -3786,18 +3817,16 @@
   <p:clrMapOvr>
     <a:masterClrMapping/>
   </p:clrMapOvr>
-  <mc:AlternateContent xmlns:mc="http://schemas.openxmlformats.org/markup-compatibility/2006">
-    <mc:Choice xmlns="" xmlns:p159="http://schemas.microsoft.com/office/powerpoint/2015/09/main" Requires="p159">
-      <p:transition xmlns:p14="http://schemas.microsoft.com/office/powerpoint/2010/main" spd="slow" p14:dur="2000">
-        <p159:morph option="byObject"/>
-      </p:transition>
-    </mc:Choice>
-    <mc:Fallback>
-      <p:transition spd="slow">
-        <p:fade/>
-      </p:transition>
-    </mc:Fallback>
-  </mc:AlternateContent>
+  <p:transition spd="slow">
+    <p:fade thruBlk="1"/>
+  </p:transition>
+  <p:timing>
+    <p:tnLst>
+      <p:par>
+        <p:cTn id="1" dur="indefinite" restart="never" nodeType="tmRoot"/>
+      </p:par>
+    </p:tnLst>
+  </p:timing>
 </p:sld>
 </file>
 
@@ -3850,7 +3879,12 @@
             <p:ph idx="1"/>
           </p:nvPr>
         </p:nvSpPr>
-        <p:spPr/>
+        <p:spPr>
+          <a:xfrm>
+            <a:off x="838200" y="1825625"/>
+            <a:ext cx="3785558" cy="4351338"/>
+          </a:xfrm>
+        </p:spPr>
         <p:txBody>
           <a:bodyPr/>
           <a:lstStyle/>
@@ -3898,6 +3932,259 @@
           </a:p>
         </p:txBody>
       </p:sp>
+      <p:sp>
+        <p:nvSpPr>
+          <p:cNvPr id="5" name="Rechteck 4"/>
+          <p:cNvSpPr/>
+          <p:nvPr/>
+        </p:nvSpPr>
+        <p:spPr>
+          <a:xfrm>
+            <a:off x="5184475" y="0"/>
+            <a:ext cx="7007525" cy="6858000"/>
+          </a:xfrm>
+          <a:prstGeom prst="rect">
+            <a:avLst/>
+          </a:prstGeom>
+          <a:solidFill>
+            <a:schemeClr val="bg1">
+              <a:lumMod val="85000"/>
+            </a:schemeClr>
+          </a:solidFill>
+          <a:ln>
+            <a:noFill/>
+          </a:ln>
+        </p:spPr>
+        <p:style>
+          <a:lnRef idx="2">
+            <a:schemeClr val="accent1">
+              <a:shade val="50000"/>
+            </a:schemeClr>
+          </a:lnRef>
+          <a:fillRef idx="1">
+            <a:schemeClr val="accent1"/>
+          </a:fillRef>
+          <a:effectRef idx="0">
+            <a:schemeClr val="accent1"/>
+          </a:effectRef>
+          <a:fontRef idx="minor">
+            <a:schemeClr val="lt1"/>
+          </a:fontRef>
+        </p:style>
+        <p:txBody>
+          <a:bodyPr rtlCol="0" anchor="ctr"/>
+          <a:lstStyle/>
+          <a:p>
+            <a:pPr algn="ctr"/>
+            <a:endParaRPr lang="de-CH"/>
+          </a:p>
+        </p:txBody>
+      </p:sp>
+      <p:pic>
+        <p:nvPicPr>
+          <p:cNvPr id="7" name="Grafik 6"/>
+          <p:cNvPicPr>
+            <a:picLocks noChangeAspect="1"/>
+          </p:cNvPicPr>
+          <p:nvPr/>
+        </p:nvPicPr>
+        <p:blipFill>
+          <a:blip r:embed="rId2" cstate="print">
+            <a:extLst>
+              <a:ext uri="{28A0092B-C50C-407E-A947-70E740481C1C}">
+                <a14:useLocalDpi xmlns:a14="http://schemas.microsoft.com/office/drawing/2010/main" val="0"/>
+              </a:ext>
+            </a:extLst>
+          </a:blip>
+          <a:stretch>
+            <a:fillRect/>
+          </a:stretch>
+        </p:blipFill>
+        <p:spPr>
+          <a:xfrm rot="5400000">
+            <a:off x="5986264" y="1182348"/>
+            <a:ext cx="5570747" cy="4178060"/>
+          </a:xfrm>
+          <a:prstGeom prst="rect">
+            <a:avLst/>
+          </a:prstGeom>
+        </p:spPr>
+      </p:pic>
+      <p:pic>
+        <p:nvPicPr>
+          <p:cNvPr id="4" name="Grafik 3"/>
+          <p:cNvPicPr>
+            <a:picLocks noChangeAspect="1"/>
+          </p:cNvPicPr>
+          <p:nvPr/>
+        </p:nvPicPr>
+        <p:blipFill>
+          <a:blip r:embed="rId3"/>
+          <a:stretch>
+            <a:fillRect/>
+          </a:stretch>
+        </p:blipFill>
+        <p:spPr>
+          <a:xfrm>
+            <a:off x="5482686" y="805204"/>
+            <a:ext cx="6577901" cy="4735352"/>
+          </a:xfrm>
+          <a:prstGeom prst="rect">
+            <a:avLst/>
+          </a:prstGeom>
+        </p:spPr>
+      </p:pic>
+      <p:sp>
+        <p:nvSpPr>
+          <p:cNvPr id="6" name="Textfeld 5"/>
+          <p:cNvSpPr txBox="1"/>
+          <p:nvPr/>
+        </p:nvSpPr>
+        <p:spPr>
+          <a:xfrm>
+            <a:off x="6157823" y="6182837"/>
+            <a:ext cx="5195977" cy="369332"/>
+          </a:xfrm>
+          <a:prstGeom prst="rect">
+            <a:avLst/>
+          </a:prstGeom>
+          <a:noFill/>
+        </p:spPr>
+        <p:txBody>
+          <a:bodyPr wrap="square" rtlCol="0">
+            <a:spAutoFit/>
+          </a:bodyPr>
+          <a:lstStyle/>
+          <a:p>
+            <a:pPr algn="ctr"/>
+            <a:r>
+              <a:rPr lang="de-CH" dirty="0" smtClean="0"/>
+              <a:t>Grundgedanke </a:t>
+            </a:r>
+            <a:endParaRPr lang="de-CH" dirty="0"/>
+          </a:p>
+        </p:txBody>
+      </p:sp>
+      <p:cxnSp>
+        <p:nvCxnSpPr>
+          <p:cNvPr id="9" name="Gerader Verbinder 8"/>
+          <p:cNvCxnSpPr/>
+          <p:nvPr/>
+        </p:nvCxnSpPr>
+        <p:spPr>
+          <a:xfrm>
+            <a:off x="7172960" y="6552169"/>
+            <a:ext cx="3098800" cy="0"/>
+          </a:xfrm>
+          <a:prstGeom prst="line">
+            <a:avLst/>
+          </a:prstGeom>
+        </p:spPr>
+        <p:style>
+          <a:lnRef idx="1">
+            <a:schemeClr val="dk1"/>
+          </a:lnRef>
+          <a:fillRef idx="0">
+            <a:schemeClr val="dk1"/>
+          </a:fillRef>
+          <a:effectRef idx="0">
+            <a:schemeClr val="dk1"/>
+          </a:effectRef>
+          <a:fontRef idx="minor">
+            <a:schemeClr val="tx1"/>
+          </a:fontRef>
+        </p:style>
+      </p:cxnSp>
+      <p:pic>
+        <p:nvPicPr>
+          <p:cNvPr id="11" name="Grafik 10"/>
+          <p:cNvPicPr>
+            <a:picLocks noChangeAspect="1"/>
+          </p:cNvPicPr>
+          <p:nvPr/>
+        </p:nvPicPr>
+        <p:blipFill>
+          <a:blip r:embed="rId4">
+            <a:extLst>
+              <a:ext uri="{28A0092B-C50C-407E-A947-70E740481C1C}">
+                <a14:useLocalDpi xmlns:a14="http://schemas.microsoft.com/office/drawing/2010/main" val="0"/>
+              </a:ext>
+            </a:extLst>
+          </a:blip>
+          <a:stretch>
+            <a:fillRect/>
+          </a:stretch>
+        </p:blipFill>
+        <p:spPr>
+          <a:xfrm>
+            <a:off x="5351273" y="-157145"/>
+            <a:ext cx="6034151" cy="6034151"/>
+          </a:xfrm>
+          <a:prstGeom prst="rect">
+            <a:avLst/>
+          </a:prstGeom>
+        </p:spPr>
+      </p:pic>
+      <p:pic>
+        <p:nvPicPr>
+          <p:cNvPr id="13" name="Grafik 12"/>
+          <p:cNvPicPr>
+            <a:picLocks noChangeAspect="1"/>
+          </p:cNvPicPr>
+          <p:nvPr/>
+        </p:nvPicPr>
+        <p:blipFill>
+          <a:blip r:embed="rId5" cstate="print">
+            <a:extLst>
+              <a:ext uri="{28A0092B-C50C-407E-A947-70E740481C1C}">
+                <a14:useLocalDpi xmlns:a14="http://schemas.microsoft.com/office/drawing/2010/main" val="0"/>
+              </a:ext>
+            </a:extLst>
+          </a:blip>
+          <a:stretch>
+            <a:fillRect/>
+          </a:stretch>
+        </p:blipFill>
+        <p:spPr>
+          <a:xfrm>
+            <a:off x="8746137" y="887487"/>
+            <a:ext cx="1876276" cy="1876276"/>
+          </a:xfrm>
+          <a:prstGeom prst="rect">
+            <a:avLst/>
+          </a:prstGeom>
+        </p:spPr>
+      </p:pic>
+      <p:pic>
+        <p:nvPicPr>
+          <p:cNvPr id="14" name="Grafik 13"/>
+          <p:cNvPicPr>
+            <a:picLocks noChangeAspect="1"/>
+          </p:cNvPicPr>
+          <p:nvPr/>
+        </p:nvPicPr>
+        <p:blipFill>
+          <a:blip r:embed="rId6" cstate="print">
+            <a:extLst>
+              <a:ext uri="{28A0092B-C50C-407E-A947-70E740481C1C}">
+                <a14:useLocalDpi xmlns:a14="http://schemas.microsoft.com/office/drawing/2010/main" val="0"/>
+              </a:ext>
+            </a:extLst>
+          </a:blip>
+          <a:stretch>
+            <a:fillRect/>
+          </a:stretch>
+        </p:blipFill>
+        <p:spPr>
+          <a:xfrm>
+            <a:off x="6747112" y="1875355"/>
+            <a:ext cx="1786602" cy="1786602"/>
+          </a:xfrm>
+          <a:prstGeom prst="rect">
+            <a:avLst/>
+          </a:prstGeom>
+        </p:spPr>
+      </p:pic>
     </p:spTree>
     <p:extLst>
       <p:ext uri="{BB962C8B-B14F-4D97-AF65-F5344CB8AC3E}">
@@ -3908,18 +4195,713 @@
   <p:clrMapOvr>
     <a:masterClrMapping/>
   </p:clrMapOvr>
-  <mc:AlternateContent xmlns:mc="http://schemas.openxmlformats.org/markup-compatibility/2006">
-    <mc:Choice xmlns="" xmlns:p159="http://schemas.microsoft.com/office/powerpoint/2015/09/main" Requires="p159">
-      <p:transition xmlns:p14="http://schemas.microsoft.com/office/powerpoint/2010/main" spd="slow" p14:dur="2000">
-        <p159:morph option="byWord"/>
-      </p:transition>
-    </mc:Choice>
-    <mc:Fallback>
-      <p:transition spd="slow">
-        <p:fade/>
-      </p:transition>
-    </mc:Fallback>
-  </mc:AlternateContent>
+  <p:transition spd="slow">
+    <p:fade thruBlk="1"/>
+  </p:transition>
+  <p:timing>
+    <p:tnLst>
+      <p:par>
+        <p:cTn id="1" dur="indefinite" restart="never" nodeType="tmRoot">
+          <p:childTnLst>
+            <p:seq concurrent="1" nextAc="seek">
+              <p:cTn id="2" dur="indefinite" nodeType="mainSeq">
+                <p:childTnLst>
+                  <p:par>
+                    <p:cTn id="3" fill="hold">
+                      <p:stCondLst>
+                        <p:cond delay="indefinite"/>
+                      </p:stCondLst>
+                      <p:childTnLst>
+                        <p:par>
+                          <p:cTn id="4" fill="hold">
+                            <p:stCondLst>
+                              <p:cond delay="0"/>
+                            </p:stCondLst>
+                            <p:childTnLst>
+                              <p:par>
+                                <p:cTn id="5" presetID="22" presetClass="entr" presetSubtype="2" fill="hold" grpId="0" nodeType="clickEffect">
+                                  <p:stCondLst>
+                                    <p:cond delay="0"/>
+                                  </p:stCondLst>
+                                  <p:childTnLst>
+                                    <p:set>
+                                      <p:cBhvr>
+                                        <p:cTn id="6" dur="1" fill="hold">
+                                          <p:stCondLst>
+                                            <p:cond delay="0"/>
+                                          </p:stCondLst>
+                                        </p:cTn>
+                                        <p:tgtEl>
+                                          <p:spTgt spid="5"/>
+                                        </p:tgtEl>
+                                        <p:attrNameLst>
+                                          <p:attrName>style.visibility</p:attrName>
+                                        </p:attrNameLst>
+                                      </p:cBhvr>
+                                      <p:to>
+                                        <p:strVal val="visible"/>
+                                      </p:to>
+                                    </p:set>
+                                    <p:animEffect transition="in" filter="wipe(right)">
+                                      <p:cBhvr>
+                                        <p:cTn id="7" dur="500"/>
+                                        <p:tgtEl>
+                                          <p:spTgt spid="5"/>
+                                        </p:tgtEl>
+                                      </p:cBhvr>
+                                    </p:animEffect>
+                                  </p:childTnLst>
+                                </p:cTn>
+                              </p:par>
+                            </p:childTnLst>
+                          </p:cTn>
+                        </p:par>
+                        <p:par>
+                          <p:cTn id="8" fill="hold">
+                            <p:stCondLst>
+                              <p:cond delay="500"/>
+                            </p:stCondLst>
+                            <p:childTnLst>
+                              <p:par>
+                                <p:cTn id="9" presetID="10" presetClass="entr" presetSubtype="0" fill="hold" grpId="0" nodeType="afterEffect">
+                                  <p:stCondLst>
+                                    <p:cond delay="0"/>
+                                  </p:stCondLst>
+                                  <p:childTnLst>
+                                    <p:set>
+                                      <p:cBhvr>
+                                        <p:cTn id="10" dur="1" fill="hold">
+                                          <p:stCondLst>
+                                            <p:cond delay="0"/>
+                                          </p:stCondLst>
+                                        </p:cTn>
+                                        <p:tgtEl>
+                                          <p:spTgt spid="6"/>
+                                        </p:tgtEl>
+                                        <p:attrNameLst>
+                                          <p:attrName>style.visibility</p:attrName>
+                                        </p:attrNameLst>
+                                      </p:cBhvr>
+                                      <p:to>
+                                        <p:strVal val="visible"/>
+                                      </p:to>
+                                    </p:set>
+                                    <p:animEffect transition="in" filter="fade">
+                                      <p:cBhvr>
+                                        <p:cTn id="11" dur="500"/>
+                                        <p:tgtEl>
+                                          <p:spTgt spid="6"/>
+                                        </p:tgtEl>
+                                      </p:cBhvr>
+                                    </p:animEffect>
+                                  </p:childTnLst>
+                                </p:cTn>
+                              </p:par>
+                              <p:par>
+                                <p:cTn id="12" presetID="10" presetClass="entr" presetSubtype="0" fill="hold" nodeType="withEffect">
+                                  <p:stCondLst>
+                                    <p:cond delay="0"/>
+                                  </p:stCondLst>
+                                  <p:childTnLst>
+                                    <p:set>
+                                      <p:cBhvr>
+                                        <p:cTn id="13" dur="1" fill="hold">
+                                          <p:stCondLst>
+                                            <p:cond delay="0"/>
+                                          </p:stCondLst>
+                                        </p:cTn>
+                                        <p:tgtEl>
+                                          <p:spTgt spid="9"/>
+                                        </p:tgtEl>
+                                        <p:attrNameLst>
+                                          <p:attrName>style.visibility</p:attrName>
+                                        </p:attrNameLst>
+                                      </p:cBhvr>
+                                      <p:to>
+                                        <p:strVal val="visible"/>
+                                      </p:to>
+                                    </p:set>
+                                    <p:animEffect transition="in" filter="fade">
+                                      <p:cBhvr>
+                                        <p:cTn id="14" dur="500"/>
+                                        <p:tgtEl>
+                                          <p:spTgt spid="9"/>
+                                        </p:tgtEl>
+                                      </p:cBhvr>
+                                    </p:animEffect>
+                                  </p:childTnLst>
+                                </p:cTn>
+                              </p:par>
+                            </p:childTnLst>
+                          </p:cTn>
+                        </p:par>
+                        <p:par>
+                          <p:cTn id="15" fill="hold">
+                            <p:stCondLst>
+                              <p:cond delay="1000"/>
+                            </p:stCondLst>
+                            <p:childTnLst>
+                              <p:par>
+                                <p:cTn id="16" presetID="10" presetClass="entr" presetSubtype="0" fill="hold" nodeType="afterEffect">
+                                  <p:stCondLst>
+                                    <p:cond delay="100"/>
+                                  </p:stCondLst>
+                                  <p:childTnLst>
+                                    <p:set>
+                                      <p:cBhvr>
+                                        <p:cTn id="17" dur="1" fill="hold">
+                                          <p:stCondLst>
+                                            <p:cond delay="0"/>
+                                          </p:stCondLst>
+                                        </p:cTn>
+                                        <p:tgtEl>
+                                          <p:spTgt spid="7"/>
+                                        </p:tgtEl>
+                                        <p:attrNameLst>
+                                          <p:attrName>style.visibility</p:attrName>
+                                        </p:attrNameLst>
+                                      </p:cBhvr>
+                                      <p:to>
+                                        <p:strVal val="visible"/>
+                                      </p:to>
+                                    </p:set>
+                                    <p:animEffect transition="in" filter="fade">
+                                      <p:cBhvr>
+                                        <p:cTn id="18" dur="500"/>
+                                        <p:tgtEl>
+                                          <p:spTgt spid="7"/>
+                                        </p:tgtEl>
+                                      </p:cBhvr>
+                                    </p:animEffect>
+                                  </p:childTnLst>
+                                </p:cTn>
+                              </p:par>
+                            </p:childTnLst>
+                          </p:cTn>
+                        </p:par>
+                      </p:childTnLst>
+                    </p:cTn>
+                  </p:par>
+                  <p:par>
+                    <p:cTn id="19" fill="hold">
+                      <p:stCondLst>
+                        <p:cond delay="indefinite"/>
+                      </p:stCondLst>
+                      <p:childTnLst>
+                        <p:par>
+                          <p:cTn id="20" fill="hold">
+                            <p:stCondLst>
+                              <p:cond delay="0"/>
+                            </p:stCondLst>
+                            <p:childTnLst>
+                              <p:par>
+                                <p:cTn id="21" presetID="10" presetClass="exit" presetSubtype="0" fill="hold" nodeType="clickEffect">
+                                  <p:stCondLst>
+                                    <p:cond delay="0"/>
+                                  </p:stCondLst>
+                                  <p:childTnLst>
+                                    <p:animEffect transition="out" filter="fade">
+                                      <p:cBhvr>
+                                        <p:cTn id="22" dur="500"/>
+                                        <p:tgtEl>
+                                          <p:spTgt spid="7"/>
+                                        </p:tgtEl>
+                                      </p:cBhvr>
+                                    </p:animEffect>
+                                    <p:set>
+                                      <p:cBhvr>
+                                        <p:cTn id="23" dur="1" fill="hold">
+                                          <p:stCondLst>
+                                            <p:cond delay="499"/>
+                                          </p:stCondLst>
+                                        </p:cTn>
+                                        <p:tgtEl>
+                                          <p:spTgt spid="7"/>
+                                        </p:tgtEl>
+                                        <p:attrNameLst>
+                                          <p:attrName>style.visibility</p:attrName>
+                                        </p:attrNameLst>
+                                      </p:cBhvr>
+                                      <p:to>
+                                        <p:strVal val="hidden"/>
+                                      </p:to>
+                                    </p:set>
+                                  </p:childTnLst>
+                                </p:cTn>
+                              </p:par>
+                              <p:par>
+                                <p:cTn id="24" presetID="10" presetClass="entr" presetSubtype="0" fill="hold" nodeType="withEffect">
+                                  <p:stCondLst>
+                                    <p:cond delay="0"/>
+                                  </p:stCondLst>
+                                  <p:childTnLst>
+                                    <p:set>
+                                      <p:cBhvr>
+                                        <p:cTn id="25" dur="1" fill="hold">
+                                          <p:stCondLst>
+                                            <p:cond delay="0"/>
+                                          </p:stCondLst>
+                                        </p:cTn>
+                                        <p:tgtEl>
+                                          <p:spTgt spid="4"/>
+                                        </p:tgtEl>
+                                        <p:attrNameLst>
+                                          <p:attrName>style.visibility</p:attrName>
+                                        </p:attrNameLst>
+                                      </p:cBhvr>
+                                      <p:to>
+                                        <p:strVal val="visible"/>
+                                      </p:to>
+                                    </p:set>
+                                    <p:animEffect transition="in" filter="fade">
+                                      <p:cBhvr>
+                                        <p:cTn id="26" dur="500"/>
+                                        <p:tgtEl>
+                                          <p:spTgt spid="4"/>
+                                        </p:tgtEl>
+                                      </p:cBhvr>
+                                    </p:animEffect>
+                                  </p:childTnLst>
+                                </p:cTn>
+                              </p:par>
+                            </p:childTnLst>
+                          </p:cTn>
+                        </p:par>
+                      </p:childTnLst>
+                    </p:cTn>
+                  </p:par>
+                  <p:par>
+                    <p:cTn id="27" fill="hold">
+                      <p:stCondLst>
+                        <p:cond delay="indefinite"/>
+                      </p:stCondLst>
+                      <p:childTnLst>
+                        <p:par>
+                          <p:cTn id="28" fill="hold">
+                            <p:stCondLst>
+                              <p:cond delay="0"/>
+                            </p:stCondLst>
+                            <p:childTnLst>
+                              <p:par>
+                                <p:cTn id="29" presetID="10" presetClass="exit" presetSubtype="0" fill="hold" nodeType="clickEffect">
+                                  <p:stCondLst>
+                                    <p:cond delay="0"/>
+                                  </p:stCondLst>
+                                  <p:childTnLst>
+                                    <p:animEffect transition="out" filter="fade">
+                                      <p:cBhvr>
+                                        <p:cTn id="30" dur="500"/>
+                                        <p:tgtEl>
+                                          <p:spTgt spid="4"/>
+                                        </p:tgtEl>
+                                      </p:cBhvr>
+                                    </p:animEffect>
+                                    <p:set>
+                                      <p:cBhvr>
+                                        <p:cTn id="31" dur="1" fill="hold">
+                                          <p:stCondLst>
+                                            <p:cond delay="499"/>
+                                          </p:stCondLst>
+                                        </p:cTn>
+                                        <p:tgtEl>
+                                          <p:spTgt spid="4"/>
+                                        </p:tgtEl>
+                                        <p:attrNameLst>
+                                          <p:attrName>style.visibility</p:attrName>
+                                        </p:attrNameLst>
+                                      </p:cBhvr>
+                                      <p:to>
+                                        <p:strVal val="hidden"/>
+                                      </p:to>
+                                    </p:set>
+                                  </p:childTnLst>
+                                </p:cTn>
+                              </p:par>
+                            </p:childTnLst>
+                          </p:cTn>
+                        </p:par>
+                        <p:par>
+                          <p:cTn id="32" fill="hold">
+                            <p:stCondLst>
+                              <p:cond delay="500"/>
+                            </p:stCondLst>
+                            <p:childTnLst>
+                              <p:par>
+                                <p:cTn id="33" presetID="10" presetClass="entr" presetSubtype="0" fill="hold" nodeType="afterEffect">
+                                  <p:stCondLst>
+                                    <p:cond delay="0"/>
+                                  </p:stCondLst>
+                                  <p:childTnLst>
+                                    <p:set>
+                                      <p:cBhvr>
+                                        <p:cTn id="34" dur="1" fill="hold">
+                                          <p:stCondLst>
+                                            <p:cond delay="0"/>
+                                          </p:stCondLst>
+                                        </p:cTn>
+                                        <p:tgtEl>
+                                          <p:spTgt spid="11"/>
+                                        </p:tgtEl>
+                                        <p:attrNameLst>
+                                          <p:attrName>style.visibility</p:attrName>
+                                        </p:attrNameLst>
+                                      </p:cBhvr>
+                                      <p:to>
+                                        <p:strVal val="visible"/>
+                                      </p:to>
+                                    </p:set>
+                                    <p:animEffect transition="in" filter="fade">
+                                      <p:cBhvr>
+                                        <p:cTn id="35" dur="500"/>
+                                        <p:tgtEl>
+                                          <p:spTgt spid="11"/>
+                                        </p:tgtEl>
+                                      </p:cBhvr>
+                                    </p:animEffect>
+                                  </p:childTnLst>
+                                </p:cTn>
+                              </p:par>
+                              <p:par>
+                                <p:cTn id="36" presetID="10" presetClass="entr" presetSubtype="0" fill="hold" nodeType="withEffect">
+                                  <p:stCondLst>
+                                    <p:cond delay="0"/>
+                                  </p:stCondLst>
+                                  <p:childTnLst>
+                                    <p:set>
+                                      <p:cBhvr>
+                                        <p:cTn id="37" dur="1" fill="hold">
+                                          <p:stCondLst>
+                                            <p:cond delay="0"/>
+                                          </p:stCondLst>
+                                        </p:cTn>
+                                        <p:tgtEl>
+                                          <p:spTgt spid="13"/>
+                                        </p:tgtEl>
+                                        <p:attrNameLst>
+                                          <p:attrName>style.visibility</p:attrName>
+                                        </p:attrNameLst>
+                                      </p:cBhvr>
+                                      <p:to>
+                                        <p:strVal val="visible"/>
+                                      </p:to>
+                                    </p:set>
+                                    <p:animEffect transition="in" filter="fade">
+                                      <p:cBhvr>
+                                        <p:cTn id="38" dur="500"/>
+                                        <p:tgtEl>
+                                          <p:spTgt spid="13"/>
+                                        </p:tgtEl>
+                                      </p:cBhvr>
+                                    </p:animEffect>
+                                  </p:childTnLst>
+                                </p:cTn>
+                              </p:par>
+                              <p:par>
+                                <p:cTn id="39" presetID="10" presetClass="entr" presetSubtype="0" fill="hold" nodeType="withEffect">
+                                  <p:stCondLst>
+                                    <p:cond delay="0"/>
+                                  </p:stCondLst>
+                                  <p:childTnLst>
+                                    <p:set>
+                                      <p:cBhvr>
+                                        <p:cTn id="40" dur="1" fill="hold">
+                                          <p:stCondLst>
+                                            <p:cond delay="0"/>
+                                          </p:stCondLst>
+                                        </p:cTn>
+                                        <p:tgtEl>
+                                          <p:spTgt spid="14"/>
+                                        </p:tgtEl>
+                                        <p:attrNameLst>
+                                          <p:attrName>style.visibility</p:attrName>
+                                        </p:attrNameLst>
+                                      </p:cBhvr>
+                                      <p:to>
+                                        <p:strVal val="visible"/>
+                                      </p:to>
+                                    </p:set>
+                                    <p:animEffect transition="in" filter="fade">
+                                      <p:cBhvr>
+                                        <p:cTn id="41" dur="500"/>
+                                        <p:tgtEl>
+                                          <p:spTgt spid="14"/>
+                                        </p:tgtEl>
+                                      </p:cBhvr>
+                                    </p:animEffect>
+                                  </p:childTnLst>
+                                </p:cTn>
+                              </p:par>
+                            </p:childTnLst>
+                          </p:cTn>
+                        </p:par>
+                      </p:childTnLst>
+                    </p:cTn>
+                  </p:par>
+                  <p:par>
+                    <p:cTn id="42" fill="hold">
+                      <p:stCondLst>
+                        <p:cond delay="indefinite"/>
+                      </p:stCondLst>
+                      <p:childTnLst>
+                        <p:par>
+                          <p:cTn id="43" fill="hold">
+                            <p:stCondLst>
+                              <p:cond delay="0"/>
+                            </p:stCondLst>
+                            <p:childTnLst>
+                              <p:par>
+                                <p:cTn id="44" presetID="10" presetClass="exit" presetSubtype="0" fill="hold" nodeType="clickEffect">
+                                  <p:stCondLst>
+                                    <p:cond delay="0"/>
+                                  </p:stCondLst>
+                                  <p:childTnLst>
+                                    <p:animEffect transition="out" filter="fade">
+                                      <p:cBhvr>
+                                        <p:cTn id="45" dur="500"/>
+                                        <p:tgtEl>
+                                          <p:spTgt spid="11"/>
+                                        </p:tgtEl>
+                                      </p:cBhvr>
+                                    </p:animEffect>
+                                    <p:set>
+                                      <p:cBhvr>
+                                        <p:cTn id="46" dur="1" fill="hold">
+                                          <p:stCondLst>
+                                            <p:cond delay="499"/>
+                                          </p:stCondLst>
+                                        </p:cTn>
+                                        <p:tgtEl>
+                                          <p:spTgt spid="11"/>
+                                        </p:tgtEl>
+                                        <p:attrNameLst>
+                                          <p:attrName>style.visibility</p:attrName>
+                                        </p:attrNameLst>
+                                      </p:cBhvr>
+                                      <p:to>
+                                        <p:strVal val="hidden"/>
+                                      </p:to>
+                                    </p:set>
+                                  </p:childTnLst>
+                                </p:cTn>
+                              </p:par>
+                              <p:par>
+                                <p:cTn id="47" presetID="10" presetClass="exit" presetSubtype="0" fill="hold" nodeType="withEffect">
+                                  <p:stCondLst>
+                                    <p:cond delay="0"/>
+                                  </p:stCondLst>
+                                  <p:childTnLst>
+                                    <p:animEffect transition="out" filter="fade">
+                                      <p:cBhvr>
+                                        <p:cTn id="48" dur="500"/>
+                                        <p:tgtEl>
+                                          <p:spTgt spid="13"/>
+                                        </p:tgtEl>
+                                      </p:cBhvr>
+                                    </p:animEffect>
+                                    <p:set>
+                                      <p:cBhvr>
+                                        <p:cTn id="49" dur="1" fill="hold">
+                                          <p:stCondLst>
+                                            <p:cond delay="499"/>
+                                          </p:stCondLst>
+                                        </p:cTn>
+                                        <p:tgtEl>
+                                          <p:spTgt spid="13"/>
+                                        </p:tgtEl>
+                                        <p:attrNameLst>
+                                          <p:attrName>style.visibility</p:attrName>
+                                        </p:attrNameLst>
+                                      </p:cBhvr>
+                                      <p:to>
+                                        <p:strVal val="hidden"/>
+                                      </p:to>
+                                    </p:set>
+                                  </p:childTnLst>
+                                </p:cTn>
+                              </p:par>
+                              <p:par>
+                                <p:cTn id="50" presetID="10" presetClass="exit" presetSubtype="0" fill="hold" nodeType="withEffect">
+                                  <p:stCondLst>
+                                    <p:cond delay="0"/>
+                                  </p:stCondLst>
+                                  <p:childTnLst>
+                                    <p:animEffect transition="out" filter="fade">
+                                      <p:cBhvr>
+                                        <p:cTn id="51" dur="500"/>
+                                        <p:tgtEl>
+                                          <p:spTgt spid="14"/>
+                                        </p:tgtEl>
+                                      </p:cBhvr>
+                                    </p:animEffect>
+                                    <p:set>
+                                      <p:cBhvr>
+                                        <p:cTn id="52" dur="1" fill="hold">
+                                          <p:stCondLst>
+                                            <p:cond delay="499"/>
+                                          </p:stCondLst>
+                                        </p:cTn>
+                                        <p:tgtEl>
+                                          <p:spTgt spid="14"/>
+                                        </p:tgtEl>
+                                        <p:attrNameLst>
+                                          <p:attrName>style.visibility</p:attrName>
+                                        </p:attrNameLst>
+                                      </p:cBhvr>
+                                      <p:to>
+                                        <p:strVal val="hidden"/>
+                                      </p:to>
+                                    </p:set>
+                                  </p:childTnLst>
+                                </p:cTn>
+                              </p:par>
+                              <p:par>
+                                <p:cTn id="53" presetID="10" presetClass="exit" presetSubtype="0" fill="hold" grpId="2" nodeType="withEffect">
+                                  <p:stCondLst>
+                                    <p:cond delay="0"/>
+                                  </p:stCondLst>
+                                  <p:childTnLst>
+                                    <p:animEffect transition="out" filter="fade">
+                                      <p:cBhvr>
+                                        <p:cTn id="54" dur="500"/>
+                                        <p:tgtEl>
+                                          <p:spTgt spid="6"/>
+                                        </p:tgtEl>
+                                      </p:cBhvr>
+                                    </p:animEffect>
+                                    <p:set>
+                                      <p:cBhvr>
+                                        <p:cTn id="55" dur="1" fill="hold">
+                                          <p:stCondLst>
+                                            <p:cond delay="499"/>
+                                          </p:stCondLst>
+                                        </p:cTn>
+                                        <p:tgtEl>
+                                          <p:spTgt spid="6"/>
+                                        </p:tgtEl>
+                                        <p:attrNameLst>
+                                          <p:attrName>style.visibility</p:attrName>
+                                        </p:attrNameLst>
+                                      </p:cBhvr>
+                                      <p:to>
+                                        <p:strVal val="hidden"/>
+                                      </p:to>
+                                    </p:set>
+                                  </p:childTnLst>
+                                </p:cTn>
+                              </p:par>
+                              <p:par>
+                                <p:cTn id="56" presetID="10" presetClass="exit" presetSubtype="0" fill="hold" nodeType="withEffect">
+                                  <p:stCondLst>
+                                    <p:cond delay="0"/>
+                                  </p:stCondLst>
+                                  <p:childTnLst>
+                                    <p:animEffect transition="out" filter="fade">
+                                      <p:cBhvr>
+                                        <p:cTn id="57" dur="500"/>
+                                        <p:tgtEl>
+                                          <p:spTgt spid="9"/>
+                                        </p:tgtEl>
+                                      </p:cBhvr>
+                                    </p:animEffect>
+                                    <p:set>
+                                      <p:cBhvr>
+                                        <p:cTn id="58" dur="1" fill="hold">
+                                          <p:stCondLst>
+                                            <p:cond delay="499"/>
+                                          </p:stCondLst>
+                                        </p:cTn>
+                                        <p:tgtEl>
+                                          <p:spTgt spid="9"/>
+                                        </p:tgtEl>
+                                        <p:attrNameLst>
+                                          <p:attrName>style.visibility</p:attrName>
+                                        </p:attrNameLst>
+                                      </p:cBhvr>
+                                      <p:to>
+                                        <p:strVal val="hidden"/>
+                                      </p:to>
+                                    </p:set>
+                                  </p:childTnLst>
+                                </p:cTn>
+                              </p:par>
+                            </p:childTnLst>
+                          </p:cTn>
+                        </p:par>
+                        <p:par>
+                          <p:cTn id="59" fill="hold">
+                            <p:stCondLst>
+                              <p:cond delay="500"/>
+                            </p:stCondLst>
+                            <p:childTnLst>
+                              <p:par>
+                                <p:cTn id="60" presetID="10" presetClass="exit" presetSubtype="0" fill="hold" grpId="1" nodeType="afterEffect">
+                                  <p:stCondLst>
+                                    <p:cond delay="0"/>
+                                  </p:stCondLst>
+                                  <p:childTnLst>
+                                    <p:animEffect transition="out" filter="fade">
+                                      <p:cBhvr>
+                                        <p:cTn id="61" dur="500"/>
+                                        <p:tgtEl>
+                                          <p:spTgt spid="5"/>
+                                        </p:tgtEl>
+                                      </p:cBhvr>
+                                    </p:animEffect>
+                                    <p:set>
+                                      <p:cBhvr>
+                                        <p:cTn id="62" dur="1" fill="hold">
+                                          <p:stCondLst>
+                                            <p:cond delay="499"/>
+                                          </p:stCondLst>
+                                        </p:cTn>
+                                        <p:tgtEl>
+                                          <p:spTgt spid="5"/>
+                                        </p:tgtEl>
+                                        <p:attrNameLst>
+                                          <p:attrName>style.visibility</p:attrName>
+                                        </p:attrNameLst>
+                                      </p:cBhvr>
+                                      <p:to>
+                                        <p:strVal val="hidden"/>
+                                      </p:to>
+                                    </p:set>
+                                  </p:childTnLst>
+                                </p:cTn>
+                              </p:par>
+                            </p:childTnLst>
+                          </p:cTn>
+                        </p:par>
+                      </p:childTnLst>
+                    </p:cTn>
+                  </p:par>
+                </p:childTnLst>
+              </p:cTn>
+              <p:prevCondLst>
+                <p:cond evt="onPrev" delay="0">
+                  <p:tgtEl>
+                    <p:sldTgt/>
+                  </p:tgtEl>
+                </p:cond>
+              </p:prevCondLst>
+              <p:nextCondLst>
+                <p:cond evt="onNext" delay="0">
+                  <p:tgtEl>
+                    <p:sldTgt/>
+                  </p:tgtEl>
+                </p:cond>
+              </p:nextCondLst>
+            </p:seq>
+          </p:childTnLst>
+        </p:cTn>
+      </p:par>
+    </p:tnLst>
+    <p:bldLst>
+      <p:bldP spid="5" grpId="0" animBg="1"/>
+      <p:bldP spid="5" grpId="1" animBg="1"/>
+      <p:bldP spid="6" grpId="0"/>
+      <p:bldP spid="6" grpId="2"/>
+    </p:bldLst>
+  </p:timing>
 </p:sld>
 </file>
 
@@ -4066,18 +5048,16 @@
   <p:clrMapOvr>
     <a:masterClrMapping/>
   </p:clrMapOvr>
-  <mc:AlternateContent xmlns:mc="http://schemas.openxmlformats.org/markup-compatibility/2006">
-    <mc:Choice xmlns="" xmlns:p159="http://schemas.microsoft.com/office/powerpoint/2015/09/main" Requires="p159">
-      <p:transition xmlns:p14="http://schemas.microsoft.com/office/powerpoint/2010/main" spd="slow" p14:dur="2000">
-        <p159:morph option="byObject"/>
-      </p:transition>
-    </mc:Choice>
-    <mc:Fallback>
-      <p:transition spd="slow">
-        <p:fade/>
-      </p:transition>
-    </mc:Fallback>
-  </mc:AlternateContent>
+  <p:transition spd="slow">
+    <p:fade thruBlk="1"/>
+  </p:transition>
+  <p:timing>
+    <p:tnLst>
+      <p:par>
+        <p:cTn id="1" dur="indefinite" restart="never" nodeType="tmRoot"/>
+      </p:par>
+    </p:tnLst>
+  </p:timing>
 </p:sld>
 </file>
 
@@ -4151,6 +5131,54 @@
               <a:rPr lang="de-CH" dirty="0"/>
               <a:t>Änderungen</a:t>
             </a:r>
+          </a:p>
+        </p:txBody>
+      </p:sp>
+      <p:sp>
+        <p:nvSpPr>
+          <p:cNvPr id="6" name="Rechteck 5"/>
+          <p:cNvSpPr/>
+          <p:nvPr/>
+        </p:nvSpPr>
+        <p:spPr>
+          <a:xfrm>
+            <a:off x="5184475" y="0"/>
+            <a:ext cx="7007525" cy="6858000"/>
+          </a:xfrm>
+          <a:prstGeom prst="rect">
+            <a:avLst/>
+          </a:prstGeom>
+          <a:solidFill>
+            <a:schemeClr val="bg1">
+              <a:lumMod val="85000"/>
+            </a:schemeClr>
+          </a:solidFill>
+          <a:ln>
+            <a:noFill/>
+          </a:ln>
+        </p:spPr>
+        <p:style>
+          <a:lnRef idx="2">
+            <a:schemeClr val="accent1">
+              <a:shade val="50000"/>
+            </a:schemeClr>
+          </a:lnRef>
+          <a:fillRef idx="1">
+            <a:schemeClr val="accent1"/>
+          </a:fillRef>
+          <a:effectRef idx="0">
+            <a:schemeClr val="accent1"/>
+          </a:effectRef>
+          <a:fontRef idx="minor">
+            <a:schemeClr val="lt1"/>
+          </a:fontRef>
+        </p:style>
+        <p:txBody>
+          <a:bodyPr rtlCol="0" anchor="ctr"/>
+          <a:lstStyle/>
+          <a:p>
+            <a:pPr algn="ctr"/>
+            <a:endParaRPr lang="de-CH"/>
           </a:p>
         </p:txBody>
       </p:sp>
@@ -4176,8 +5204,8 @@
         </p:blipFill>
         <p:spPr>
           <a:xfrm>
-            <a:off x="4474346" y="1474133"/>
-            <a:ext cx="6731300" cy="4638142"/>
+            <a:off x="5473256" y="1027906"/>
+            <a:ext cx="6498206" cy="4477531"/>
           </a:xfrm>
           <a:prstGeom prst="rect">
             <a:avLst/>
@@ -4200,8 +5228,92 @@
         </p:blipFill>
         <p:spPr>
           <a:xfrm>
-            <a:off x="4252404" y="1998720"/>
-            <a:ext cx="7467981" cy="4248492"/>
+            <a:off x="5338686" y="1385132"/>
+            <a:ext cx="6767347" cy="3849906"/>
+          </a:xfrm>
+          <a:prstGeom prst="rect">
+            <a:avLst/>
+          </a:prstGeom>
+        </p:spPr>
+      </p:pic>
+      <p:sp>
+        <p:nvSpPr>
+          <p:cNvPr id="7" name="Textfeld 6"/>
+          <p:cNvSpPr txBox="1"/>
+          <p:nvPr/>
+        </p:nvSpPr>
+        <p:spPr>
+          <a:xfrm>
+            <a:off x="6157823" y="6182837"/>
+            <a:ext cx="5195977" cy="369332"/>
+          </a:xfrm>
+          <a:prstGeom prst="rect">
+            <a:avLst/>
+          </a:prstGeom>
+          <a:noFill/>
+        </p:spPr>
+        <p:txBody>
+          <a:bodyPr wrap="square" rtlCol="0">
+            <a:spAutoFit/>
+          </a:bodyPr>
+          <a:lstStyle/>
+          <a:p>
+            <a:pPr algn="ctr"/>
+            <a:r>
+              <a:rPr lang="de-CH" dirty="0" smtClean="0"/>
+              <a:t>Design</a:t>
+            </a:r>
+          </a:p>
+        </p:txBody>
+      </p:sp>
+      <p:cxnSp>
+        <p:nvCxnSpPr>
+          <p:cNvPr id="8" name="Gerader Verbinder 7"/>
+          <p:cNvCxnSpPr/>
+          <p:nvPr/>
+        </p:nvCxnSpPr>
+        <p:spPr>
+          <a:xfrm>
+            <a:off x="7172960" y="6552169"/>
+            <a:ext cx="3098800" cy="0"/>
+          </a:xfrm>
+          <a:prstGeom prst="line">
+            <a:avLst/>
+          </a:prstGeom>
+        </p:spPr>
+        <p:style>
+          <a:lnRef idx="1">
+            <a:schemeClr val="dk1"/>
+          </a:lnRef>
+          <a:fillRef idx="0">
+            <a:schemeClr val="dk1"/>
+          </a:fillRef>
+          <a:effectRef idx="0">
+            <a:schemeClr val="dk1"/>
+          </a:effectRef>
+          <a:fontRef idx="minor">
+            <a:schemeClr val="tx1"/>
+          </a:fontRef>
+        </p:style>
+      </p:cxnSp>
+      <p:pic>
+        <p:nvPicPr>
+          <p:cNvPr id="9" name="Grafik 8"/>
+          <p:cNvPicPr>
+            <a:picLocks noChangeAspect="1"/>
+          </p:cNvPicPr>
+          <p:nvPr/>
+        </p:nvPicPr>
+        <p:blipFill>
+          <a:blip r:embed="rId4"/>
+          <a:stretch>
+            <a:fillRect/>
+          </a:stretch>
+        </p:blipFill>
+        <p:spPr>
+          <a:xfrm>
+            <a:off x="6563127" y="301706"/>
+            <a:ext cx="4385368" cy="5575300"/>
           </a:xfrm>
           <a:prstGeom prst="rect">
             <a:avLst/>
@@ -4218,18 +5330,567 @@
   <p:clrMapOvr>
     <a:masterClrMapping/>
   </p:clrMapOvr>
-  <mc:AlternateContent xmlns:mc="http://schemas.openxmlformats.org/markup-compatibility/2006">
-    <mc:Choice xmlns="" xmlns:p159="http://schemas.microsoft.com/office/powerpoint/2015/09/main" Requires="p159">
-      <p:transition xmlns:p14="http://schemas.microsoft.com/office/powerpoint/2010/main" spd="slow" p14:dur="2000">
-        <p159:morph option="byObject"/>
-      </p:transition>
-    </mc:Choice>
-    <mc:Fallback>
-      <p:transition spd="slow">
-        <p:fade/>
-      </p:transition>
-    </mc:Fallback>
-  </mc:AlternateContent>
+  <p:transition spd="slow">
+    <p:fade thruBlk="1"/>
+  </p:transition>
+  <p:timing>
+    <p:tnLst>
+      <p:par>
+        <p:cTn id="1" dur="indefinite" restart="never" nodeType="tmRoot">
+          <p:childTnLst>
+            <p:seq concurrent="1" nextAc="seek">
+              <p:cTn id="2" dur="indefinite" nodeType="mainSeq">
+                <p:childTnLst>
+                  <p:par>
+                    <p:cTn id="3" fill="hold">
+                      <p:stCondLst>
+                        <p:cond delay="indefinite"/>
+                        <p:cond evt="onBegin" delay="0">
+                          <p:tn val="2"/>
+                        </p:cond>
+                      </p:stCondLst>
+                      <p:childTnLst>
+                        <p:par>
+                          <p:cTn id="4" fill="hold">
+                            <p:stCondLst>
+                              <p:cond delay="0"/>
+                            </p:stCondLst>
+                            <p:childTnLst>
+                              <p:par>
+                                <p:cTn id="5" presetID="10" presetClass="entr" presetSubtype="0" fill="hold" grpId="0" nodeType="afterEffect">
+                                  <p:stCondLst>
+                                    <p:cond delay="0"/>
+                                  </p:stCondLst>
+                                  <p:childTnLst>
+                                    <p:set>
+                                      <p:cBhvr>
+                                        <p:cTn id="6" dur="1" fill="hold">
+                                          <p:stCondLst>
+                                            <p:cond delay="0"/>
+                                          </p:stCondLst>
+                                        </p:cTn>
+                                        <p:tgtEl>
+                                          <p:spTgt spid="6"/>
+                                        </p:tgtEl>
+                                        <p:attrNameLst>
+                                          <p:attrName>style.visibility</p:attrName>
+                                        </p:attrNameLst>
+                                      </p:cBhvr>
+                                      <p:to>
+                                        <p:strVal val="visible"/>
+                                      </p:to>
+                                    </p:set>
+                                    <p:animEffect transition="in" filter="fade">
+                                      <p:cBhvr>
+                                        <p:cTn id="7" dur="500"/>
+                                        <p:tgtEl>
+                                          <p:spTgt spid="6"/>
+                                        </p:tgtEl>
+                                      </p:cBhvr>
+                                    </p:animEffect>
+                                  </p:childTnLst>
+                                </p:cTn>
+                              </p:par>
+                            </p:childTnLst>
+                          </p:cTn>
+                        </p:par>
+                        <p:par>
+                          <p:cTn id="8" fill="hold">
+                            <p:stCondLst>
+                              <p:cond delay="500"/>
+                            </p:stCondLst>
+                            <p:childTnLst>
+                              <p:par>
+                                <p:cTn id="9" presetID="10" presetClass="entr" presetSubtype="0" fill="hold" grpId="0" nodeType="afterEffect">
+                                  <p:stCondLst>
+                                    <p:cond delay="0"/>
+                                  </p:stCondLst>
+                                  <p:childTnLst>
+                                    <p:set>
+                                      <p:cBhvr>
+                                        <p:cTn id="10" dur="1" fill="hold">
+                                          <p:stCondLst>
+                                            <p:cond delay="0"/>
+                                          </p:stCondLst>
+                                        </p:cTn>
+                                        <p:tgtEl>
+                                          <p:spTgt spid="7"/>
+                                        </p:tgtEl>
+                                        <p:attrNameLst>
+                                          <p:attrName>style.visibility</p:attrName>
+                                        </p:attrNameLst>
+                                      </p:cBhvr>
+                                      <p:to>
+                                        <p:strVal val="visible"/>
+                                      </p:to>
+                                    </p:set>
+                                    <p:animEffect transition="in" filter="fade">
+                                      <p:cBhvr>
+                                        <p:cTn id="11" dur="500"/>
+                                        <p:tgtEl>
+                                          <p:spTgt spid="7"/>
+                                        </p:tgtEl>
+                                      </p:cBhvr>
+                                    </p:animEffect>
+                                  </p:childTnLst>
+                                </p:cTn>
+                              </p:par>
+                              <p:par>
+                                <p:cTn id="12" presetID="10" presetClass="entr" presetSubtype="0" fill="hold" nodeType="withEffect">
+                                  <p:stCondLst>
+                                    <p:cond delay="0"/>
+                                  </p:stCondLst>
+                                  <p:childTnLst>
+                                    <p:set>
+                                      <p:cBhvr>
+                                        <p:cTn id="13" dur="1" fill="hold">
+                                          <p:stCondLst>
+                                            <p:cond delay="0"/>
+                                          </p:stCondLst>
+                                        </p:cTn>
+                                        <p:tgtEl>
+                                          <p:spTgt spid="8"/>
+                                        </p:tgtEl>
+                                        <p:attrNameLst>
+                                          <p:attrName>style.visibility</p:attrName>
+                                        </p:attrNameLst>
+                                      </p:cBhvr>
+                                      <p:to>
+                                        <p:strVal val="visible"/>
+                                      </p:to>
+                                    </p:set>
+                                    <p:animEffect transition="in" filter="fade">
+                                      <p:cBhvr>
+                                        <p:cTn id="14" dur="500"/>
+                                        <p:tgtEl>
+                                          <p:spTgt spid="8"/>
+                                        </p:tgtEl>
+                                      </p:cBhvr>
+                                    </p:animEffect>
+                                  </p:childTnLst>
+                                </p:cTn>
+                              </p:par>
+                              <p:par>
+                                <p:cTn id="15" presetID="10" presetClass="entr" presetSubtype="0" fill="hold" nodeType="withEffect">
+                                  <p:stCondLst>
+                                    <p:cond delay="0"/>
+                                  </p:stCondLst>
+                                  <p:childTnLst>
+                                    <p:set>
+                                      <p:cBhvr>
+                                        <p:cTn id="16" dur="1" fill="hold">
+                                          <p:stCondLst>
+                                            <p:cond delay="0"/>
+                                          </p:stCondLst>
+                                        </p:cTn>
+                                        <p:tgtEl>
+                                          <p:spTgt spid="4"/>
+                                        </p:tgtEl>
+                                        <p:attrNameLst>
+                                          <p:attrName>style.visibility</p:attrName>
+                                        </p:attrNameLst>
+                                      </p:cBhvr>
+                                      <p:to>
+                                        <p:strVal val="visible"/>
+                                      </p:to>
+                                    </p:set>
+                                    <p:animEffect transition="in" filter="fade">
+                                      <p:cBhvr>
+                                        <p:cTn id="17" dur="500"/>
+                                        <p:tgtEl>
+                                          <p:spTgt spid="4"/>
+                                        </p:tgtEl>
+                                      </p:cBhvr>
+                                    </p:animEffect>
+                                  </p:childTnLst>
+                                </p:cTn>
+                              </p:par>
+                            </p:childTnLst>
+                          </p:cTn>
+                        </p:par>
+                      </p:childTnLst>
+                    </p:cTn>
+                  </p:par>
+                  <p:par>
+                    <p:cTn id="18" fill="hold">
+                      <p:stCondLst>
+                        <p:cond delay="indefinite"/>
+                      </p:stCondLst>
+                      <p:childTnLst>
+                        <p:par>
+                          <p:cTn id="19" fill="hold">
+                            <p:stCondLst>
+                              <p:cond delay="0"/>
+                            </p:stCondLst>
+                            <p:childTnLst>
+                              <p:par>
+                                <p:cTn id="20" presetID="10" presetClass="exit" presetSubtype="0" fill="hold" nodeType="clickEffect">
+                                  <p:stCondLst>
+                                    <p:cond delay="0"/>
+                                  </p:stCondLst>
+                                  <p:childTnLst>
+                                    <p:animEffect transition="out" filter="fade">
+                                      <p:cBhvr>
+                                        <p:cTn id="21" dur="500"/>
+                                        <p:tgtEl>
+                                          <p:spTgt spid="4"/>
+                                        </p:tgtEl>
+                                      </p:cBhvr>
+                                    </p:animEffect>
+                                    <p:set>
+                                      <p:cBhvr>
+                                        <p:cTn id="22" dur="1" fill="hold">
+                                          <p:stCondLst>
+                                            <p:cond delay="499"/>
+                                          </p:stCondLst>
+                                        </p:cTn>
+                                        <p:tgtEl>
+                                          <p:spTgt spid="4"/>
+                                        </p:tgtEl>
+                                        <p:attrNameLst>
+                                          <p:attrName>style.visibility</p:attrName>
+                                        </p:attrNameLst>
+                                      </p:cBhvr>
+                                      <p:to>
+                                        <p:strVal val="hidden"/>
+                                      </p:to>
+                                    </p:set>
+                                  </p:childTnLst>
+                                </p:cTn>
+                              </p:par>
+                              <p:par>
+                                <p:cTn id="23" presetID="10" presetClass="entr" presetSubtype="0" fill="hold" nodeType="withEffect">
+                                  <p:stCondLst>
+                                    <p:cond delay="0"/>
+                                  </p:stCondLst>
+                                  <p:childTnLst>
+                                    <p:set>
+                                      <p:cBhvr>
+                                        <p:cTn id="24" dur="1" fill="hold">
+                                          <p:stCondLst>
+                                            <p:cond delay="0"/>
+                                          </p:stCondLst>
+                                        </p:cTn>
+                                        <p:tgtEl>
+                                          <p:spTgt spid="5"/>
+                                        </p:tgtEl>
+                                        <p:attrNameLst>
+                                          <p:attrName>style.visibility</p:attrName>
+                                        </p:attrNameLst>
+                                      </p:cBhvr>
+                                      <p:to>
+                                        <p:strVal val="visible"/>
+                                      </p:to>
+                                    </p:set>
+                                    <p:animEffect transition="in" filter="fade">
+                                      <p:cBhvr>
+                                        <p:cTn id="25" dur="500"/>
+                                        <p:tgtEl>
+                                          <p:spTgt spid="5"/>
+                                        </p:tgtEl>
+                                      </p:cBhvr>
+                                    </p:animEffect>
+                                  </p:childTnLst>
+                                </p:cTn>
+                              </p:par>
+                            </p:childTnLst>
+                          </p:cTn>
+                        </p:par>
+                      </p:childTnLst>
+                    </p:cTn>
+                  </p:par>
+                  <p:par>
+                    <p:cTn id="26" fill="hold">
+                      <p:stCondLst>
+                        <p:cond delay="indefinite"/>
+                      </p:stCondLst>
+                      <p:childTnLst>
+                        <p:par>
+                          <p:cTn id="27" fill="hold">
+                            <p:stCondLst>
+                              <p:cond delay="0"/>
+                            </p:stCondLst>
+                            <p:childTnLst>
+                              <p:par>
+                                <p:cTn id="28" presetID="10" presetClass="exit" presetSubtype="0" fill="hold" nodeType="clickEffect">
+                                  <p:stCondLst>
+                                    <p:cond delay="0"/>
+                                  </p:stCondLst>
+                                  <p:childTnLst>
+                                    <p:animEffect transition="out" filter="fade">
+                                      <p:cBhvr>
+                                        <p:cTn id="29" dur="500"/>
+                                        <p:tgtEl>
+                                          <p:spTgt spid="5"/>
+                                        </p:tgtEl>
+                                      </p:cBhvr>
+                                    </p:animEffect>
+                                    <p:set>
+                                      <p:cBhvr>
+                                        <p:cTn id="30" dur="1" fill="hold">
+                                          <p:stCondLst>
+                                            <p:cond delay="499"/>
+                                          </p:stCondLst>
+                                        </p:cTn>
+                                        <p:tgtEl>
+                                          <p:spTgt spid="5"/>
+                                        </p:tgtEl>
+                                        <p:attrNameLst>
+                                          <p:attrName>style.visibility</p:attrName>
+                                        </p:attrNameLst>
+                                      </p:cBhvr>
+                                      <p:to>
+                                        <p:strVal val="hidden"/>
+                                      </p:to>
+                                    </p:set>
+                                  </p:childTnLst>
+                                </p:cTn>
+                              </p:par>
+                            </p:childTnLst>
+                          </p:cTn>
+                        </p:par>
+                        <p:par>
+                          <p:cTn id="31" fill="hold">
+                            <p:stCondLst>
+                              <p:cond delay="500"/>
+                            </p:stCondLst>
+                            <p:childTnLst>
+                              <p:par>
+                                <p:cTn id="32" presetID="10" presetClass="entr" presetSubtype="0" fill="hold" nodeType="afterEffect">
+                                  <p:stCondLst>
+                                    <p:cond delay="0"/>
+                                  </p:stCondLst>
+                                  <p:childTnLst>
+                                    <p:set>
+                                      <p:cBhvr>
+                                        <p:cTn id="33" dur="1" fill="hold">
+                                          <p:stCondLst>
+                                            <p:cond delay="0"/>
+                                          </p:stCondLst>
+                                        </p:cTn>
+                                        <p:tgtEl>
+                                          <p:spTgt spid="9"/>
+                                        </p:tgtEl>
+                                        <p:attrNameLst>
+                                          <p:attrName>style.visibility</p:attrName>
+                                        </p:attrNameLst>
+                                      </p:cBhvr>
+                                      <p:to>
+                                        <p:strVal val="visible"/>
+                                      </p:to>
+                                    </p:set>
+                                    <p:animEffect transition="in" filter="fade">
+                                      <p:cBhvr>
+                                        <p:cTn id="34" dur="500"/>
+                                        <p:tgtEl>
+                                          <p:spTgt spid="9"/>
+                                        </p:tgtEl>
+                                      </p:cBhvr>
+                                    </p:animEffect>
+                                  </p:childTnLst>
+                                </p:cTn>
+                              </p:par>
+                            </p:childTnLst>
+                          </p:cTn>
+                        </p:par>
+                      </p:childTnLst>
+                    </p:cTn>
+                  </p:par>
+                  <p:par>
+                    <p:cTn id="35" fill="hold">
+                      <p:stCondLst>
+                        <p:cond delay="indefinite"/>
+                      </p:stCondLst>
+                      <p:childTnLst>
+                        <p:par>
+                          <p:cTn id="36" fill="hold">
+                            <p:stCondLst>
+                              <p:cond delay="0"/>
+                            </p:stCondLst>
+                            <p:childTnLst>
+                              <p:par>
+                                <p:cTn id="37" presetID="10" presetClass="exit" presetSubtype="0" fill="hold" grpId="1" nodeType="clickEffect">
+                                  <p:stCondLst>
+                                    <p:cond delay="0"/>
+                                  </p:stCondLst>
+                                  <p:childTnLst>
+                                    <p:animEffect transition="out" filter="fade">
+                                      <p:cBhvr>
+                                        <p:cTn id="38" dur="500"/>
+                                        <p:tgtEl>
+                                          <p:spTgt spid="7"/>
+                                        </p:tgtEl>
+                                      </p:cBhvr>
+                                    </p:animEffect>
+                                    <p:set>
+                                      <p:cBhvr>
+                                        <p:cTn id="39" dur="1" fill="hold">
+                                          <p:stCondLst>
+                                            <p:cond delay="499"/>
+                                          </p:stCondLst>
+                                        </p:cTn>
+                                        <p:tgtEl>
+                                          <p:spTgt spid="7"/>
+                                        </p:tgtEl>
+                                        <p:attrNameLst>
+                                          <p:attrName>style.visibility</p:attrName>
+                                        </p:attrNameLst>
+                                      </p:cBhvr>
+                                      <p:to>
+                                        <p:strVal val="hidden"/>
+                                      </p:to>
+                                    </p:set>
+                                  </p:childTnLst>
+                                </p:cTn>
+                              </p:par>
+                              <p:par>
+                                <p:cTn id="40" presetID="10" presetClass="exit" presetSubtype="0" fill="hold" nodeType="withEffect">
+                                  <p:stCondLst>
+                                    <p:cond delay="0"/>
+                                  </p:stCondLst>
+                                  <p:childTnLst>
+                                    <p:animEffect transition="out" filter="fade">
+                                      <p:cBhvr>
+                                        <p:cTn id="41" dur="500"/>
+                                        <p:tgtEl>
+                                          <p:spTgt spid="8"/>
+                                        </p:tgtEl>
+                                      </p:cBhvr>
+                                    </p:animEffect>
+                                    <p:set>
+                                      <p:cBhvr>
+                                        <p:cTn id="42" dur="1" fill="hold">
+                                          <p:stCondLst>
+                                            <p:cond delay="499"/>
+                                          </p:stCondLst>
+                                        </p:cTn>
+                                        <p:tgtEl>
+                                          <p:spTgt spid="8"/>
+                                        </p:tgtEl>
+                                        <p:attrNameLst>
+                                          <p:attrName>style.visibility</p:attrName>
+                                        </p:attrNameLst>
+                                      </p:cBhvr>
+                                      <p:to>
+                                        <p:strVal val="hidden"/>
+                                      </p:to>
+                                    </p:set>
+                                  </p:childTnLst>
+                                </p:cTn>
+                              </p:par>
+                              <p:par>
+                                <p:cTn id="43" presetID="10" presetClass="exit" presetSubtype="0" fill="hold" nodeType="withEffect">
+                                  <p:stCondLst>
+                                    <p:cond delay="0"/>
+                                  </p:stCondLst>
+                                  <p:childTnLst>
+                                    <p:animEffect transition="out" filter="fade">
+                                      <p:cBhvr>
+                                        <p:cTn id="44" dur="500"/>
+                                        <p:tgtEl>
+                                          <p:spTgt spid="9"/>
+                                        </p:tgtEl>
+                                      </p:cBhvr>
+                                    </p:animEffect>
+                                    <p:set>
+                                      <p:cBhvr>
+                                        <p:cTn id="45" dur="1" fill="hold">
+                                          <p:stCondLst>
+                                            <p:cond delay="499"/>
+                                          </p:stCondLst>
+                                        </p:cTn>
+                                        <p:tgtEl>
+                                          <p:spTgt spid="9"/>
+                                        </p:tgtEl>
+                                        <p:attrNameLst>
+                                          <p:attrName>style.visibility</p:attrName>
+                                        </p:attrNameLst>
+                                      </p:cBhvr>
+                                      <p:to>
+                                        <p:strVal val="hidden"/>
+                                      </p:to>
+                                    </p:set>
+                                  </p:childTnLst>
+                                </p:cTn>
+                              </p:par>
+                            </p:childTnLst>
+                          </p:cTn>
+                        </p:par>
+                        <p:par>
+                          <p:cTn id="46" fill="hold">
+                            <p:stCondLst>
+                              <p:cond delay="500"/>
+                            </p:stCondLst>
+                            <p:childTnLst>
+                              <p:par>
+                                <p:cTn id="47" presetID="10" presetClass="exit" presetSubtype="0" fill="hold" grpId="1" nodeType="afterEffect">
+                                  <p:stCondLst>
+                                    <p:cond delay="0"/>
+                                  </p:stCondLst>
+                                  <p:childTnLst>
+                                    <p:animEffect transition="out" filter="fade">
+                                      <p:cBhvr>
+                                        <p:cTn id="48" dur="500"/>
+                                        <p:tgtEl>
+                                          <p:spTgt spid="6"/>
+                                        </p:tgtEl>
+                                      </p:cBhvr>
+                                    </p:animEffect>
+                                    <p:set>
+                                      <p:cBhvr>
+                                        <p:cTn id="49" dur="1" fill="hold">
+                                          <p:stCondLst>
+                                            <p:cond delay="499"/>
+                                          </p:stCondLst>
+                                        </p:cTn>
+                                        <p:tgtEl>
+                                          <p:spTgt spid="6"/>
+                                        </p:tgtEl>
+                                        <p:attrNameLst>
+                                          <p:attrName>style.visibility</p:attrName>
+                                        </p:attrNameLst>
+                                      </p:cBhvr>
+                                      <p:to>
+                                        <p:strVal val="hidden"/>
+                                      </p:to>
+                                    </p:set>
+                                  </p:childTnLst>
+                                </p:cTn>
+                              </p:par>
+                            </p:childTnLst>
+                          </p:cTn>
+                        </p:par>
+                      </p:childTnLst>
+                    </p:cTn>
+                  </p:par>
+                </p:childTnLst>
+              </p:cTn>
+              <p:prevCondLst>
+                <p:cond evt="onPrev" delay="0">
+                  <p:tgtEl>
+                    <p:sldTgt/>
+                  </p:tgtEl>
+                </p:cond>
+              </p:prevCondLst>
+              <p:nextCondLst>
+                <p:cond evt="onNext" delay="0">
+                  <p:tgtEl>
+                    <p:sldTgt/>
+                  </p:tgtEl>
+                </p:cond>
+              </p:nextCondLst>
+            </p:seq>
+          </p:childTnLst>
+        </p:cTn>
+      </p:par>
+    </p:tnLst>
+    <p:bldLst>
+      <p:bldP spid="6" grpId="0" animBg="1"/>
+      <p:bldP spid="6" grpId="1" animBg="1"/>
+      <p:bldP spid="7" grpId="0"/>
+      <p:bldP spid="7" grpId="1"/>
+    </p:bldLst>
+  </p:timing>
 </p:sld>
 </file>
 
@@ -4334,18 +5995,16 @@
   <p:clrMapOvr>
     <a:masterClrMapping/>
   </p:clrMapOvr>
-  <mc:AlternateContent xmlns:mc="http://schemas.openxmlformats.org/markup-compatibility/2006">
-    <mc:Choice xmlns="" xmlns:p159="http://schemas.microsoft.com/office/powerpoint/2015/09/main" Requires="p159">
-      <p:transition xmlns:p14="http://schemas.microsoft.com/office/powerpoint/2010/main" spd="slow" p14:dur="2000">
-        <p159:morph option="byObject"/>
-      </p:transition>
-    </mc:Choice>
-    <mc:Fallback>
-      <p:transition spd="slow">
-        <p:fade/>
-      </p:transition>
-    </mc:Fallback>
-  </mc:AlternateContent>
+  <p:transition spd="slow">
+    <p:fade thruBlk="1"/>
+  </p:transition>
+  <p:timing>
+    <p:tnLst>
+      <p:par>
+        <p:cTn id="1" dur="indefinite" restart="never" nodeType="tmRoot"/>
+      </p:par>
+    </p:tnLst>
+  </p:timing>
 </p:sld>
 </file>
 
@@ -4461,18 +6120,16 @@
   <p:clrMapOvr>
     <a:masterClrMapping/>
   </p:clrMapOvr>
-  <mc:AlternateContent xmlns:mc="http://schemas.openxmlformats.org/markup-compatibility/2006">
-    <mc:Choice xmlns="" xmlns:p159="http://schemas.microsoft.com/office/powerpoint/2015/09/main" Requires="p159">
-      <p:transition xmlns:p14="http://schemas.microsoft.com/office/powerpoint/2010/main" spd="slow" p14:dur="2000">
-        <p159:morph option="byObject"/>
-      </p:transition>
-    </mc:Choice>
-    <mc:Fallback>
-      <p:transition spd="slow">
-        <p:fade/>
-      </p:transition>
-    </mc:Fallback>
-  </mc:AlternateContent>
+  <p:transition spd="slow">
+    <p:fade thruBlk="1"/>
+  </p:transition>
+  <p:timing>
+    <p:tnLst>
+      <p:par>
+        <p:cTn id="1" dur="indefinite" restart="never" nodeType="tmRoot"/>
+      </p:par>
+    </p:tnLst>
+  </p:timing>
 </p:sld>
 </file>
 
@@ -4555,18 +6212,9 @@
   <p:clrMapOvr>
     <a:masterClrMapping/>
   </p:clrMapOvr>
-  <mc:AlternateContent xmlns:mc="http://schemas.openxmlformats.org/markup-compatibility/2006">
-    <mc:Choice xmlns="" xmlns:p159="http://schemas.microsoft.com/office/powerpoint/2015/09/main" Requires="p159">
-      <p:transition xmlns:p14="http://schemas.microsoft.com/office/powerpoint/2010/main" spd="slow" p14:dur="2000">
-        <p159:morph option="byObject"/>
-      </p:transition>
-    </mc:Choice>
-    <mc:Fallback>
-      <p:transition spd="slow">
-        <p:fade/>
-      </p:transition>
-    </mc:Fallback>
-  </mc:AlternateContent>
+  <p:transition spd="slow">
+    <p:fade thruBlk="1"/>
+  </p:transition>
 </p:sld>
 </file>
 

</xml_diff>